<commit_message>
typo fixed in slide
</commit_message>
<xml_diff>
--- a/01_Introduction.pptx
+++ b/01_Introduction.pptx
@@ -242,7 +242,7 @@
           <a:p>
             <a:fld id="{B0B2B5F3-CA21-B746-93BD-89BD39E53309}" type="datetimeFigureOut">
               <a:rPr lang="en-US" smtClean="0"/>
-              <a:t>2/2/21</a:t>
+              <a:t>2/3/21</a:t>
             </a:fld>
             <a:endParaRPr lang="en-US"/>
           </a:p>
@@ -662,7 +662,10 @@
           <a:bodyPr/>
           <a:lstStyle/>
           <a:p>
-            <a:endParaRPr lang="en-US" dirty="0"/>
+            <a:r>
+              <a:rPr lang="en-US" dirty="0"/>
+              <a:t>TYPO</a:t>
+            </a:r>
           </a:p>
         </p:txBody>
       </p:sp>
@@ -6897,10 +6900,10 @@
       </p:pic>
       <p:pic>
         <p:nvPicPr>
-          <p:cNvPr id="16" name="Picture 15">
+          <p:cNvPr id="18" name="Picture 17">
             <a:extLst>
               <a:ext uri="{FF2B5EF4-FFF2-40B4-BE49-F238E27FC236}">
-                <a16:creationId xmlns:a16="http://schemas.microsoft.com/office/drawing/2014/main" id="{27AA6C08-81DB-4B48-9ED8-54DBA0DC2008}"/>
+                <a16:creationId xmlns:a16="http://schemas.microsoft.com/office/drawing/2014/main" id="{A0FF67DA-5D49-0E44-BCCA-03763E5470C6}"/>
               </a:ext>
             </a:extLst>
           </p:cNvPr>
@@ -6917,8 +6920,8 @@
         </p:blipFill>
         <p:spPr>
           <a:xfrm>
-            <a:off x="4250173" y="4268164"/>
-            <a:ext cx="3955929" cy="1791591"/>
+            <a:off x="8099361" y="4109759"/>
+            <a:ext cx="4332514" cy="2166257"/>
           </a:xfrm>
           <a:prstGeom prst="rect">
             <a:avLst/>
@@ -6927,10 +6930,10 @@
       </p:pic>
       <p:pic>
         <p:nvPicPr>
-          <p:cNvPr id="18" name="Picture 17">
+          <p:cNvPr id="7" name="Picture 6">
             <a:extLst>
               <a:ext uri="{FF2B5EF4-FFF2-40B4-BE49-F238E27FC236}">
-                <a16:creationId xmlns:a16="http://schemas.microsoft.com/office/drawing/2014/main" id="{A0FF67DA-5D49-0E44-BCCA-03763E5470C6}"/>
+                <a16:creationId xmlns:a16="http://schemas.microsoft.com/office/drawing/2014/main" id="{E38E7D8B-F54B-644F-867E-795239CC0264}"/>
               </a:ext>
             </a:extLst>
           </p:cNvPr>
@@ -6947,8 +6950,8 @@
         </p:blipFill>
         <p:spPr>
           <a:xfrm>
-            <a:off x="8099361" y="4109759"/>
-            <a:ext cx="4332514" cy="2166257"/>
+            <a:off x="4433299" y="4268164"/>
+            <a:ext cx="3519197" cy="1791591"/>
           </a:xfrm>
           <a:prstGeom prst="rect">
             <a:avLst/>
@@ -24061,7 +24064,7 @@
               <a:buNone/>
             </a:pPr>
             <a:r>
-              <a:rPr lang="en" sz="1000" kern="0">
+              <a:rPr lang="en" sz="1000" kern="0" dirty="0">
                 <a:solidFill>
                   <a:srgbClr val="595959"/>
                 </a:solidFill>
@@ -24069,9 +24072,31 @@
                 <a:cs typeface="Arial"/>
                 <a:sym typeface="Arial"/>
               </a:rPr>
-              <a:t>ref: https://cs231n.github.io/python-numpy-tutorial/</a:t>
-            </a:r>
-            <a:endParaRPr sz="1000" kern="0">
+              <a:t>ref: https://cs231n.github.io/python-</a:t>
+            </a:r>
+            <a:r>
+              <a:rPr lang="en" sz="1000" kern="0" dirty="0" err="1">
+                <a:solidFill>
+                  <a:srgbClr val="595959"/>
+                </a:solidFill>
+                <a:latin typeface="Arial"/>
+                <a:cs typeface="Arial"/>
+                <a:sym typeface="Arial"/>
+              </a:rPr>
+              <a:t>numpy</a:t>
+            </a:r>
+            <a:r>
+              <a:rPr lang="en" sz="1000" kern="0" dirty="0">
+                <a:solidFill>
+                  <a:srgbClr val="595959"/>
+                </a:solidFill>
+                <a:latin typeface="Arial"/>
+                <a:cs typeface="Arial"/>
+                <a:sym typeface="Arial"/>
+              </a:rPr>
+              <a:t>-tutorial/</a:t>
+            </a:r>
+            <a:endParaRPr sz="1000" kern="0" dirty="0">
               <a:solidFill>
                 <a:srgbClr val="595959"/>
               </a:solidFill>
@@ -26944,7 +26969,7 @@
           </p:nvSpPr>
           <p:spPr>
             <a:xfrm>
-              <a:off x="4313153" y="3213556"/>
+              <a:off x="4240067" y="3027931"/>
               <a:ext cx="1389435" cy="430887"/>
             </a:xfrm>
             <a:prstGeom prst="rect">

</xml_diff>